<commit_message>
fer ; presentation ; sob ; pain
</commit_message>
<xml_diff>
--- a/FER/componenta preturilor/componenta costurilor.pptx
+++ b/FER/componenta preturilor/componenta costurilor.pptx
@@ -11,6 +11,8 @@
     <p:sldId id="259" r:id="rId5"/>
     <p:sldId id="260" r:id="rId6"/>
     <p:sldId id="261" r:id="rId7"/>
+    <p:sldId id="262" r:id="rId8"/>
+    <p:sldId id="263" r:id="rId9"/>
   </p:sldIdLst>
   <p:sldSz cx="12192000" cy="6858000"/>
   <p:notesSz cx="6858000" cy="9144000"/>
@@ -115,6 +117,839 @@
     </p:ext>
   </p:extLst>
 </p:presentation>
+</file>
+
+<file path=ppt/charts/chart1.xml><?xml version="1.0" encoding="utf-8"?>
+<c:chartSpace xmlns:c="http://schemas.openxmlformats.org/drawingml/2006/chart" xmlns:a="http://schemas.openxmlformats.org/drawingml/2006/main" xmlns:r="http://schemas.openxmlformats.org/officeDocument/2006/relationships" xmlns:c16r2="http://schemas.microsoft.com/office/drawing/2015/06/chart">
+  <c:date1904 val="0"/>
+  <c:lang val="en-US"/>
+  <c:roundedCorners val="0"/>
+  <mc:AlternateContent xmlns:mc="http://schemas.openxmlformats.org/markup-compatibility/2006">
+    <mc:Choice xmlns:c14="http://schemas.microsoft.com/office/drawing/2007/8/2/chart" Requires="c14">
+      <c14:style val="102"/>
+    </mc:Choice>
+    <mc:Fallback>
+      <c:style val="2"/>
+    </mc:Fallback>
+  </mc:AlternateContent>
+  <c:chart>
+    <c:title>
+      <c:overlay val="0"/>
+      <c:spPr>
+        <a:noFill/>
+        <a:ln>
+          <a:noFill/>
+        </a:ln>
+        <a:effectLst/>
+      </c:spPr>
+      <c:txPr>
+        <a:bodyPr rot="0" spcFirstLastPara="1" vertOverflow="ellipsis" vert="horz" wrap="square" anchor="ctr" anchorCtr="1"/>
+        <a:lstStyle/>
+        <a:p>
+          <a:pPr>
+            <a:defRPr sz="1862" b="0" i="0" u="none" strike="noStrike" kern="1200" spc="0" baseline="0">
+              <a:solidFill>
+                <a:schemeClr val="tx1">
+                  <a:lumMod val="65000"/>
+                  <a:lumOff val="35000"/>
+                </a:schemeClr>
+              </a:solidFill>
+              <a:latin typeface="+mn-lt"/>
+              <a:ea typeface="+mn-ea"/>
+              <a:cs typeface="+mn-cs"/>
+            </a:defRPr>
+          </a:pPr>
+          <a:endParaRPr lang="en-US"/>
+        </a:p>
+      </c:txPr>
+    </c:title>
+    <c:autoTitleDeleted val="0"/>
+    <c:plotArea>
+      <c:layout>
+        <c:manualLayout>
+          <c:layoutTarget val="inner"/>
+          <c:xMode val="edge"/>
+          <c:yMode val="edge"/>
+          <c:x val="4.9489633285714173E-3"/>
+          <c:y val="0.32003213028380317"/>
+          <c:w val="0.51201506978817657"/>
+          <c:h val="0.66399722864931776"/>
+        </c:manualLayout>
+      </c:layout>
+      <c:doughnutChart>
+        <c:varyColors val="1"/>
+        <c:ser>
+          <c:idx val="0"/>
+          <c:order val="0"/>
+          <c:tx>
+            <c:strRef>
+              <c:f>Sheet1!$B$1</c:f>
+              <c:strCache>
+                <c:ptCount val="1"/>
+                <c:pt idx="0">
+                  <c:v>Componența costurilor</c:v>
+                </c:pt>
+              </c:strCache>
+            </c:strRef>
+          </c:tx>
+          <c:dPt>
+            <c:idx val="0"/>
+            <c:bubble3D val="0"/>
+            <c:spPr>
+              <a:solidFill>
+                <a:schemeClr val="accent2"/>
+              </a:solidFill>
+              <a:ln w="19050">
+                <a:solidFill>
+                  <a:schemeClr val="lt1"/>
+                </a:solidFill>
+              </a:ln>
+              <a:effectLst/>
+            </c:spPr>
+          </c:dPt>
+          <c:dPt>
+            <c:idx val="1"/>
+            <c:bubble3D val="0"/>
+            <c:spPr>
+              <a:solidFill>
+                <a:schemeClr val="accent4"/>
+              </a:solidFill>
+              <a:ln w="19050">
+                <a:solidFill>
+                  <a:schemeClr val="lt1"/>
+                </a:solidFill>
+              </a:ln>
+              <a:effectLst/>
+            </c:spPr>
+          </c:dPt>
+          <c:dPt>
+            <c:idx val="2"/>
+            <c:bubble3D val="0"/>
+            <c:spPr>
+              <a:solidFill>
+                <a:schemeClr val="accent6"/>
+              </a:solidFill>
+              <a:ln w="19050">
+                <a:solidFill>
+                  <a:schemeClr val="lt1"/>
+                </a:solidFill>
+              </a:ln>
+              <a:effectLst/>
+            </c:spPr>
+          </c:dPt>
+          <c:dPt>
+            <c:idx val="3"/>
+            <c:bubble3D val="0"/>
+            <c:spPr>
+              <a:solidFill>
+                <a:schemeClr val="accent2">
+                  <a:lumMod val="60000"/>
+                </a:schemeClr>
+              </a:solidFill>
+              <a:ln w="19050">
+                <a:solidFill>
+                  <a:schemeClr val="lt1"/>
+                </a:solidFill>
+              </a:ln>
+              <a:effectLst/>
+            </c:spPr>
+          </c:dPt>
+          <c:cat>
+            <c:strRef>
+              <c:f>Sheet1!$A$2:$A$5</c:f>
+              <c:strCache>
+                <c:ptCount val="4"/>
+                <c:pt idx="0">
+                  <c:v>Venitul brut</c:v>
+                </c:pt>
+                <c:pt idx="1">
+                  <c:v>Cheltuieli SG&amp;A</c:v>
+                </c:pt>
+                <c:pt idx="2">
+                  <c:v>Cheltuieli neobișnuite</c:v>
+                </c:pt>
+                <c:pt idx="3">
+                  <c:v>Cheltuieli de amortizare </c:v>
+                </c:pt>
+              </c:strCache>
+            </c:strRef>
+          </c:cat>
+          <c:val>
+            <c:numRef>
+              <c:f>Sheet1!$B$2:$B$5</c:f>
+              <c:numCache>
+                <c:formatCode>#,##0</c:formatCode>
+                <c:ptCount val="4"/>
+                <c:pt idx="0">
+                  <c:v>97618</c:v>
+                </c:pt>
+                <c:pt idx="1">
+                  <c:v>56571</c:v>
+                </c:pt>
+                <c:pt idx="2">
+                  <c:v>5159</c:v>
+                </c:pt>
+                <c:pt idx="3">
+                  <c:v>13697</c:v>
+                </c:pt>
+              </c:numCache>
+            </c:numRef>
+          </c:val>
+          <c:extLst>
+            <c:ext xmlns:c16="http://schemas.microsoft.com/office/drawing/2014/chart" uri="{C3380CC4-5D6E-409C-BE32-E72D297353CC}">
+              <c16:uniqueId val="{00000000-2290-48BD-8496-4CA7BD8D0305}"/>
+            </c:ext>
+          </c:extLst>
+        </c:ser>
+        <c:dLbls>
+          <c:showLegendKey val="0"/>
+          <c:showVal val="0"/>
+          <c:showCatName val="0"/>
+          <c:showSerName val="0"/>
+          <c:showPercent val="0"/>
+          <c:showBubbleSize val="0"/>
+          <c:showLeaderLines val="1"/>
+        </c:dLbls>
+        <c:firstSliceAng val="0"/>
+        <c:holeSize val="50"/>
+      </c:doughnutChart>
+      <c:spPr>
+        <a:noFill/>
+        <a:ln>
+          <a:noFill/>
+        </a:ln>
+        <a:effectLst/>
+      </c:spPr>
+    </c:plotArea>
+    <c:legend>
+      <c:legendPos val="b"/>
+      <c:layout>
+        <c:manualLayout>
+          <c:xMode val="edge"/>
+          <c:yMode val="edge"/>
+          <c:x val="0.54568321802638464"/>
+          <c:y val="0.1721560112764258"/>
+          <c:w val="0.45054504842580101"/>
+          <c:h val="0.8085900753404115"/>
+        </c:manualLayout>
+      </c:layout>
+      <c:overlay val="0"/>
+      <c:spPr>
+        <a:noFill/>
+        <a:ln>
+          <a:noFill/>
+        </a:ln>
+        <a:effectLst/>
+      </c:spPr>
+      <c:txPr>
+        <a:bodyPr rot="0" spcFirstLastPara="1" vertOverflow="ellipsis" vert="horz" wrap="square" anchor="ctr" anchorCtr="1"/>
+        <a:lstStyle/>
+        <a:p>
+          <a:pPr>
+            <a:defRPr sz="1500" b="0" i="0" u="none" strike="noStrike" kern="1200" baseline="0">
+              <a:solidFill>
+                <a:schemeClr val="tx1">
+                  <a:lumMod val="65000"/>
+                  <a:lumOff val="35000"/>
+                </a:schemeClr>
+              </a:solidFill>
+              <a:latin typeface="+mn-lt"/>
+              <a:ea typeface="+mn-ea"/>
+              <a:cs typeface="+mn-cs"/>
+            </a:defRPr>
+          </a:pPr>
+          <a:endParaRPr lang="en-US"/>
+        </a:p>
+      </c:txPr>
+    </c:legend>
+    <c:plotVisOnly val="1"/>
+    <c:dispBlanksAs val="gap"/>
+    <c:extLst>
+      <c:ext xmlns:c16r3="http://schemas.microsoft.com/office/drawing/2017/03/chart" uri="{56B9EC1D-385E-4148-901F-78D8002777C0}">
+        <c16r3:dataDisplayOptions16>
+          <c16r3:dispNaAsBlank val="1"/>
+        </c16r3:dataDisplayOptions16>
+      </c:ext>
+    </c:extLst>
+    <c:showDLblsOverMax val="0"/>
+  </c:chart>
+  <c:spPr>
+    <a:noFill/>
+    <a:ln>
+      <a:noFill/>
+    </a:ln>
+    <a:effectLst/>
+  </c:spPr>
+  <c:txPr>
+    <a:bodyPr/>
+    <a:lstStyle/>
+    <a:p>
+      <a:pPr>
+        <a:defRPr/>
+      </a:pPr>
+      <a:endParaRPr lang="en-US"/>
+    </a:p>
+  </c:txPr>
+  <c:externalData r:id="rId3">
+    <c:autoUpdate val="0"/>
+  </c:externalData>
+</c:chartSpace>
+</file>
+
+<file path=ppt/charts/colors1.xml><?xml version="1.0" encoding="utf-8"?>
+<cs:colorStyle xmlns:cs="http://schemas.microsoft.com/office/drawing/2012/chartStyle" xmlns:a="http://schemas.openxmlformats.org/drawingml/2006/main" meth="cycle" id="12">
+  <a:schemeClr val="accent2"/>
+  <a:schemeClr val="accent4"/>
+  <a:schemeClr val="accent6"/>
+  <cs:variation/>
+  <cs:variation>
+    <a:lumMod val="60000"/>
+  </cs:variation>
+  <cs:variation>
+    <a:lumMod val="80000"/>
+    <a:lumOff val="20000"/>
+  </cs:variation>
+  <cs:variation>
+    <a:lumMod val="80000"/>
+  </cs:variation>
+  <cs:variation>
+    <a:lumMod val="60000"/>
+    <a:lumOff val="40000"/>
+  </cs:variation>
+  <cs:variation>
+    <a:lumMod val="50000"/>
+  </cs:variation>
+  <cs:variation>
+    <a:lumMod val="70000"/>
+    <a:lumOff val="30000"/>
+  </cs:variation>
+  <cs:variation>
+    <a:lumMod val="70000"/>
+  </cs:variation>
+  <cs:variation>
+    <a:lumMod val="50000"/>
+    <a:lumOff val="50000"/>
+  </cs:variation>
+</cs:colorStyle>
+</file>
+
+<file path=ppt/charts/style1.xml><?xml version="1.0" encoding="utf-8"?>
+<cs:chartStyle xmlns:cs="http://schemas.microsoft.com/office/drawing/2012/chartStyle" xmlns:a="http://schemas.openxmlformats.org/drawingml/2006/main" id="251">
+  <cs:axisTitle>
+    <cs:lnRef idx="0"/>
+    <cs:fillRef idx="0"/>
+    <cs:effectRef idx="0"/>
+    <cs:fontRef idx="minor">
+      <a:schemeClr val="tx1">
+        <a:lumMod val="65000"/>
+        <a:lumOff val="35000"/>
+      </a:schemeClr>
+    </cs:fontRef>
+    <cs:defRPr sz="1330" kern="1200"/>
+  </cs:axisTitle>
+  <cs:categoryAxis>
+    <cs:lnRef idx="0"/>
+    <cs:fillRef idx="0"/>
+    <cs:effectRef idx="0"/>
+    <cs:fontRef idx="minor">
+      <a:schemeClr val="tx1">
+        <a:lumMod val="65000"/>
+        <a:lumOff val="35000"/>
+      </a:schemeClr>
+    </cs:fontRef>
+    <cs:spPr>
+      <a:ln w="9525" cap="flat" cmpd="sng" algn="ctr">
+        <a:solidFill>
+          <a:schemeClr val="tx1">
+            <a:lumMod val="15000"/>
+            <a:lumOff val="85000"/>
+          </a:schemeClr>
+        </a:solidFill>
+        <a:round/>
+      </a:ln>
+    </cs:spPr>
+    <cs:defRPr sz="1197" kern="1200"/>
+  </cs:categoryAxis>
+  <cs:chartArea mods="allowNoFillOverride allowNoLineOverride">
+    <cs:lnRef idx="0"/>
+    <cs:fillRef idx="0"/>
+    <cs:effectRef idx="0"/>
+    <cs:fontRef idx="minor">
+      <a:schemeClr val="tx1"/>
+    </cs:fontRef>
+    <cs:spPr>
+      <a:solidFill>
+        <a:schemeClr val="bg1"/>
+      </a:solidFill>
+      <a:ln w="9525" cap="flat" cmpd="sng" algn="ctr">
+        <a:solidFill>
+          <a:schemeClr val="tx1">
+            <a:lumMod val="15000"/>
+            <a:lumOff val="85000"/>
+          </a:schemeClr>
+        </a:solidFill>
+        <a:round/>
+      </a:ln>
+    </cs:spPr>
+    <cs:defRPr sz="1197" kern="1200"/>
+  </cs:chartArea>
+  <cs:dataLabel>
+    <cs:lnRef idx="0"/>
+    <cs:fillRef idx="0"/>
+    <cs:effectRef idx="0"/>
+    <cs:fontRef idx="minor">
+      <a:schemeClr val="tx1">
+        <a:lumMod val="75000"/>
+        <a:lumOff val="25000"/>
+      </a:schemeClr>
+    </cs:fontRef>
+    <cs:defRPr sz="1197" kern="1200"/>
+  </cs:dataLabel>
+  <cs:dataLabelCallout>
+    <cs:lnRef idx="0"/>
+    <cs:fillRef idx="0"/>
+    <cs:effectRef idx="0"/>
+    <cs:fontRef idx="minor">
+      <a:schemeClr val="dk1">
+        <a:lumMod val="65000"/>
+        <a:lumOff val="35000"/>
+      </a:schemeClr>
+    </cs:fontRef>
+    <cs:spPr>
+      <a:solidFill>
+        <a:schemeClr val="lt1"/>
+      </a:solidFill>
+      <a:ln>
+        <a:solidFill>
+          <a:schemeClr val="dk1">
+            <a:lumMod val="25000"/>
+            <a:lumOff val="75000"/>
+          </a:schemeClr>
+        </a:solidFill>
+      </a:ln>
+    </cs:spPr>
+    <cs:defRPr sz="1197" kern="1200"/>
+    <cs:bodyPr rot="0" spcFirstLastPara="1" vertOverflow="clip" horzOverflow="clip" vert="horz" wrap="square" lIns="36576" tIns="18288" rIns="36576" bIns="18288" anchor="ctr" anchorCtr="1">
+      <a:spAutoFit/>
+    </cs:bodyPr>
+  </cs:dataLabelCallout>
+  <cs:dataPoint>
+    <cs:lnRef idx="0"/>
+    <cs:fillRef idx="1">
+      <cs:styleClr val="auto"/>
+    </cs:fillRef>
+    <cs:effectRef idx="0"/>
+    <cs:fontRef idx="minor">
+      <a:schemeClr val="tx1"/>
+    </cs:fontRef>
+    <cs:spPr>
+      <a:ln w="19050">
+        <a:solidFill>
+          <a:schemeClr val="lt1"/>
+        </a:solidFill>
+      </a:ln>
+    </cs:spPr>
+  </cs:dataPoint>
+  <cs:dataPoint3D>
+    <cs:lnRef idx="0"/>
+    <cs:fillRef idx="1">
+      <cs:styleClr val="auto"/>
+    </cs:fillRef>
+    <cs:effectRef idx="0"/>
+    <cs:fontRef idx="minor">
+      <a:schemeClr val="tx1"/>
+    </cs:fontRef>
+    <cs:spPr>
+      <a:ln w="25400">
+        <a:solidFill>
+          <a:schemeClr val="lt1"/>
+        </a:solidFill>
+      </a:ln>
+    </cs:spPr>
+  </cs:dataPoint3D>
+  <cs:dataPointLine>
+    <cs:lnRef idx="0">
+      <cs:styleClr val="auto"/>
+    </cs:lnRef>
+    <cs:fillRef idx="0"/>
+    <cs:effectRef idx="0"/>
+    <cs:fontRef idx="minor">
+      <a:schemeClr val="tx1"/>
+    </cs:fontRef>
+    <cs:spPr>
+      <a:ln w="28575" cap="rnd">
+        <a:solidFill>
+          <a:schemeClr val="phClr"/>
+        </a:solidFill>
+        <a:round/>
+      </a:ln>
+    </cs:spPr>
+  </cs:dataPointLine>
+  <cs:dataPointMarker>
+    <cs:lnRef idx="0">
+      <cs:styleClr val="auto"/>
+    </cs:lnRef>
+    <cs:fillRef idx="1">
+      <cs:styleClr val="auto"/>
+    </cs:fillRef>
+    <cs:effectRef idx="0"/>
+    <cs:fontRef idx="minor">
+      <a:schemeClr val="tx1"/>
+    </cs:fontRef>
+    <cs:spPr>
+      <a:ln w="9525">
+        <a:solidFill>
+          <a:schemeClr val="phClr"/>
+        </a:solidFill>
+      </a:ln>
+    </cs:spPr>
+  </cs:dataPointMarker>
+  <cs:dataPointMarkerLayout symbol="circle" size="5"/>
+  <cs:dataPointWireframe>
+    <cs:lnRef idx="0">
+      <cs:styleClr val="auto"/>
+    </cs:lnRef>
+    <cs:fillRef idx="0"/>
+    <cs:effectRef idx="0"/>
+    <cs:fontRef idx="minor">
+      <a:schemeClr val="tx1"/>
+    </cs:fontRef>
+    <cs:spPr>
+      <a:ln w="9525" cap="rnd">
+        <a:solidFill>
+          <a:schemeClr val="phClr"/>
+        </a:solidFill>
+        <a:round/>
+      </a:ln>
+    </cs:spPr>
+  </cs:dataPointWireframe>
+  <cs:dataTable>
+    <cs:lnRef idx="0"/>
+    <cs:fillRef idx="0"/>
+    <cs:effectRef idx="0"/>
+    <cs:fontRef idx="minor">
+      <a:schemeClr val="tx1">
+        <a:lumMod val="65000"/>
+        <a:lumOff val="35000"/>
+      </a:schemeClr>
+    </cs:fontRef>
+    <cs:spPr>
+      <a:noFill/>
+      <a:ln w="9525" cap="flat" cmpd="sng" algn="ctr">
+        <a:solidFill>
+          <a:schemeClr val="tx1">
+            <a:lumMod val="15000"/>
+            <a:lumOff val="85000"/>
+          </a:schemeClr>
+        </a:solidFill>
+        <a:round/>
+      </a:ln>
+    </cs:spPr>
+    <cs:defRPr sz="1197" kern="1200"/>
+  </cs:dataTable>
+  <cs:downBar>
+    <cs:lnRef idx="0"/>
+    <cs:fillRef idx="0"/>
+    <cs:effectRef idx="0"/>
+    <cs:fontRef idx="minor">
+      <a:schemeClr val="tx1"/>
+    </cs:fontRef>
+    <cs:spPr>
+      <a:solidFill>
+        <a:schemeClr val="dk1">
+          <a:lumMod val="75000"/>
+          <a:lumOff val="25000"/>
+        </a:schemeClr>
+      </a:solidFill>
+      <a:ln w="9525" cap="flat" cmpd="sng" algn="ctr">
+        <a:solidFill>
+          <a:schemeClr val="tx1">
+            <a:lumMod val="65000"/>
+            <a:lumOff val="35000"/>
+          </a:schemeClr>
+        </a:solidFill>
+        <a:round/>
+      </a:ln>
+    </cs:spPr>
+  </cs:downBar>
+  <cs:dropLine>
+    <cs:lnRef idx="0"/>
+    <cs:fillRef idx="0"/>
+    <cs:effectRef idx="0"/>
+    <cs:fontRef idx="minor">
+      <a:schemeClr val="tx1"/>
+    </cs:fontRef>
+    <cs:spPr>
+      <a:ln w="9525" cap="flat" cmpd="sng" algn="ctr">
+        <a:solidFill>
+          <a:schemeClr val="tx1">
+            <a:lumMod val="35000"/>
+            <a:lumOff val="65000"/>
+          </a:schemeClr>
+        </a:solidFill>
+        <a:round/>
+      </a:ln>
+    </cs:spPr>
+  </cs:dropLine>
+  <cs:errorBar>
+    <cs:lnRef idx="0"/>
+    <cs:fillRef idx="0"/>
+    <cs:effectRef idx="0"/>
+    <cs:fontRef idx="minor">
+      <a:schemeClr val="tx1"/>
+    </cs:fontRef>
+    <cs:spPr>
+      <a:ln w="9525" cap="flat" cmpd="sng" algn="ctr">
+        <a:solidFill>
+          <a:schemeClr val="tx1">
+            <a:lumMod val="65000"/>
+            <a:lumOff val="35000"/>
+          </a:schemeClr>
+        </a:solidFill>
+        <a:round/>
+      </a:ln>
+    </cs:spPr>
+  </cs:errorBar>
+  <cs:floor>
+    <cs:lnRef idx="0"/>
+    <cs:fillRef idx="0"/>
+    <cs:effectRef idx="0"/>
+    <cs:fontRef idx="minor">
+      <a:schemeClr val="tx1"/>
+    </cs:fontRef>
+    <cs:spPr>
+      <a:noFill/>
+      <a:ln>
+        <a:noFill/>
+      </a:ln>
+    </cs:spPr>
+  </cs:floor>
+  <cs:gridlineMajor>
+    <cs:lnRef idx="0"/>
+    <cs:fillRef idx="0"/>
+    <cs:effectRef idx="0"/>
+    <cs:fontRef idx="minor">
+      <a:schemeClr val="tx1"/>
+    </cs:fontRef>
+    <cs:spPr>
+      <a:ln w="9525" cap="flat" cmpd="sng" algn="ctr">
+        <a:solidFill>
+          <a:schemeClr val="tx1">
+            <a:lumMod val="15000"/>
+            <a:lumOff val="85000"/>
+          </a:schemeClr>
+        </a:solidFill>
+        <a:round/>
+      </a:ln>
+    </cs:spPr>
+  </cs:gridlineMajor>
+  <cs:gridlineMinor>
+    <cs:lnRef idx="0"/>
+    <cs:fillRef idx="0"/>
+    <cs:effectRef idx="0"/>
+    <cs:fontRef idx="minor">
+      <a:schemeClr val="tx1"/>
+    </cs:fontRef>
+    <cs:spPr>
+      <a:ln w="9525" cap="flat" cmpd="sng" algn="ctr">
+        <a:solidFill>
+          <a:schemeClr val="tx1">
+            <a:lumMod val="5000"/>
+            <a:lumOff val="95000"/>
+          </a:schemeClr>
+        </a:solidFill>
+        <a:round/>
+      </a:ln>
+    </cs:spPr>
+  </cs:gridlineMinor>
+  <cs:hiLoLine>
+    <cs:lnRef idx="0"/>
+    <cs:fillRef idx="0"/>
+    <cs:effectRef idx="0"/>
+    <cs:fontRef idx="minor">
+      <a:schemeClr val="tx1"/>
+    </cs:fontRef>
+    <cs:spPr>
+      <a:ln w="9525" cap="flat" cmpd="sng" algn="ctr">
+        <a:solidFill>
+          <a:schemeClr val="tx1">
+            <a:lumMod val="50000"/>
+            <a:lumOff val="50000"/>
+          </a:schemeClr>
+        </a:solidFill>
+        <a:round/>
+      </a:ln>
+    </cs:spPr>
+  </cs:hiLoLine>
+  <cs:leaderLine>
+    <cs:lnRef idx="0"/>
+    <cs:fillRef idx="0"/>
+    <cs:effectRef idx="0"/>
+    <cs:fontRef idx="minor">
+      <a:schemeClr val="tx1"/>
+    </cs:fontRef>
+    <cs:spPr>
+      <a:ln w="9525" cap="flat" cmpd="sng" algn="ctr">
+        <a:solidFill>
+          <a:schemeClr val="tx1">
+            <a:lumMod val="35000"/>
+            <a:lumOff val="65000"/>
+          </a:schemeClr>
+        </a:solidFill>
+        <a:round/>
+      </a:ln>
+    </cs:spPr>
+  </cs:leaderLine>
+  <cs:legend>
+    <cs:lnRef idx="0"/>
+    <cs:fillRef idx="0"/>
+    <cs:effectRef idx="0"/>
+    <cs:fontRef idx="minor">
+      <a:schemeClr val="tx1">
+        <a:lumMod val="65000"/>
+        <a:lumOff val="35000"/>
+      </a:schemeClr>
+    </cs:fontRef>
+    <cs:defRPr sz="1197" kern="1200"/>
+  </cs:legend>
+  <cs:plotArea mods="allowNoFillOverride allowNoLineOverride">
+    <cs:lnRef idx="0"/>
+    <cs:fillRef idx="0"/>
+    <cs:effectRef idx="0"/>
+    <cs:fontRef idx="minor">
+      <a:schemeClr val="tx1"/>
+    </cs:fontRef>
+  </cs:plotArea>
+  <cs:plotArea3D mods="allowNoFillOverride allowNoLineOverride">
+    <cs:lnRef idx="0"/>
+    <cs:fillRef idx="0"/>
+    <cs:effectRef idx="0"/>
+    <cs:fontRef idx="minor">
+      <a:schemeClr val="tx1"/>
+    </cs:fontRef>
+  </cs:plotArea3D>
+  <cs:seriesAxis>
+    <cs:lnRef idx="0"/>
+    <cs:fillRef idx="0"/>
+    <cs:effectRef idx="0"/>
+    <cs:fontRef idx="minor">
+      <a:schemeClr val="tx1">
+        <a:lumMod val="65000"/>
+        <a:lumOff val="35000"/>
+      </a:schemeClr>
+    </cs:fontRef>
+    <cs:defRPr sz="1197" kern="1200"/>
+  </cs:seriesAxis>
+  <cs:seriesLine>
+    <cs:lnRef idx="0"/>
+    <cs:fillRef idx="0"/>
+    <cs:effectRef idx="0"/>
+    <cs:fontRef idx="minor">
+      <a:schemeClr val="tx1"/>
+    </cs:fontRef>
+    <cs:spPr>
+      <a:ln w="9525" cap="flat" cmpd="sng" algn="ctr">
+        <a:solidFill>
+          <a:schemeClr val="tx1">
+            <a:lumMod val="35000"/>
+            <a:lumOff val="65000"/>
+          </a:schemeClr>
+        </a:solidFill>
+        <a:round/>
+      </a:ln>
+    </cs:spPr>
+  </cs:seriesLine>
+  <cs:title>
+    <cs:lnRef idx="0"/>
+    <cs:fillRef idx="0"/>
+    <cs:effectRef idx="0"/>
+    <cs:fontRef idx="minor">
+      <a:schemeClr val="tx1">
+        <a:lumMod val="65000"/>
+        <a:lumOff val="35000"/>
+      </a:schemeClr>
+    </cs:fontRef>
+    <cs:defRPr sz="1862" b="0" kern="1200" spc="0" baseline="0"/>
+  </cs:title>
+  <cs:trendline>
+    <cs:lnRef idx="0">
+      <cs:styleClr val="auto"/>
+    </cs:lnRef>
+    <cs:fillRef idx="0"/>
+    <cs:effectRef idx="0"/>
+    <cs:fontRef idx="minor">
+      <a:schemeClr val="tx1"/>
+    </cs:fontRef>
+    <cs:spPr>
+      <a:ln w="19050" cap="rnd">
+        <a:solidFill>
+          <a:schemeClr val="phClr"/>
+        </a:solidFill>
+        <a:prstDash val="sysDot"/>
+      </a:ln>
+    </cs:spPr>
+  </cs:trendline>
+  <cs:trendlineLabel>
+    <cs:lnRef idx="0"/>
+    <cs:fillRef idx="0"/>
+    <cs:effectRef idx="0"/>
+    <cs:fontRef idx="minor">
+      <a:schemeClr val="tx1">
+        <a:lumMod val="65000"/>
+        <a:lumOff val="35000"/>
+      </a:schemeClr>
+    </cs:fontRef>
+    <cs:defRPr sz="1197" kern="1200"/>
+  </cs:trendlineLabel>
+  <cs:upBar>
+    <cs:lnRef idx="0"/>
+    <cs:fillRef idx="0"/>
+    <cs:effectRef idx="0"/>
+    <cs:fontRef idx="minor">
+      <a:schemeClr val="tx1"/>
+    </cs:fontRef>
+    <cs:spPr>
+      <a:solidFill>
+        <a:schemeClr val="lt1"/>
+      </a:solidFill>
+      <a:ln w="9525" cap="flat" cmpd="sng" algn="ctr">
+        <a:solidFill>
+          <a:schemeClr val="tx1">
+            <a:lumMod val="65000"/>
+            <a:lumOff val="35000"/>
+          </a:schemeClr>
+        </a:solidFill>
+        <a:round/>
+      </a:ln>
+    </cs:spPr>
+  </cs:upBar>
+  <cs:valueAxis>
+    <cs:lnRef idx="0"/>
+    <cs:fillRef idx="0"/>
+    <cs:effectRef idx="0"/>
+    <cs:fontRef idx="minor">
+      <a:schemeClr val="tx1">
+        <a:lumMod val="65000"/>
+        <a:lumOff val="35000"/>
+      </a:schemeClr>
+    </cs:fontRef>
+    <cs:defRPr sz="1197" kern="1200"/>
+  </cs:valueAxis>
+  <cs:wall>
+    <cs:lnRef idx="0"/>
+    <cs:fillRef idx="0"/>
+    <cs:effectRef idx="0"/>
+    <cs:fontRef idx="minor">
+      <a:schemeClr val="tx1"/>
+    </cs:fontRef>
+    <cs:spPr>
+      <a:noFill/>
+      <a:ln>
+        <a:noFill/>
+      </a:ln>
+    </cs:spPr>
+  </cs:wall>
+</cs:chartStyle>
 </file>
 
 <file path=ppt/slideLayouts/slideLayout1.xml><?xml version="1.0" encoding="utf-8"?>
@@ -3470,7 +4305,12 @@
             <p:ph idx="1"/>
           </p:nvPr>
         </p:nvSpPr>
-        <p:spPr/>
+        <p:spPr>
+          <a:xfrm>
+            <a:off x="2231136" y="3429000"/>
+            <a:ext cx="7729728" cy="1741464"/>
+          </a:xfrm>
+        </p:spPr>
         <p:txBody>
           <a:bodyPr>
             <a:normAutofit/>
@@ -3836,6 +4676,9 @@
           </a:bodyPr>
           <a:lstStyle/>
           <a:p>
+            <a:pPr marL="0" indent="0">
+              <a:buNone/>
+            </a:pPr>
             <a:r>
               <a:rPr lang="en-US" sz="2500" dirty="0" err="1"/>
               <a:t>Costul</a:t>
@@ -4240,6 +5083,17 @@
 <file path=ppt/slides/slide6.xml><?xml version="1.0" encoding="utf-8"?>
 <p:sld xmlns:a="http://schemas.openxmlformats.org/drawingml/2006/main" xmlns:r="http://schemas.openxmlformats.org/officeDocument/2006/relationships" xmlns:p="http://schemas.openxmlformats.org/presentationml/2006/main">
   <p:cSld>
+    <p:bg>
+      <p:bgPr>
+        <a:solidFill>
+          <a:schemeClr val="accent3">
+            <a:lumMod val="20000"/>
+            <a:lumOff val="80000"/>
+          </a:schemeClr>
+        </a:solidFill>
+        <a:effectLst/>
+      </p:bgPr>
+    </p:bg>
     <p:spTree>
       <p:nvGrpSpPr>
         <p:cNvPr id="1" name=""/>
@@ -4275,7 +5129,11 @@
           <a:bodyPr/>
           <a:lstStyle/>
           <a:p>
-            <a:endParaRPr lang="ro-RO"/>
+            <a:r>
+              <a:rPr lang="en-US" dirty="0"/>
+              <a:t>GOOGLE</a:t>
+            </a:r>
+            <a:endParaRPr lang="ro-RO" dirty="0"/>
           </a:p>
         </p:txBody>
       </p:sp>
@@ -4295,12 +5153,340 @@
             <p:ph idx="1"/>
           </p:nvPr>
         </p:nvSpPr>
-        <p:spPr/>
-        <p:txBody>
-          <a:bodyPr/>
-          <a:lstStyle/>
-          <a:p>
-            <a:endParaRPr lang="ro-RO"/>
+        <p:spPr>
+          <a:xfrm>
+            <a:off x="3066081" y="2488195"/>
+            <a:ext cx="6059837" cy="442474"/>
+          </a:xfrm>
+        </p:spPr>
+        <p:txBody>
+          <a:bodyPr>
+            <a:noAutofit/>
+          </a:bodyPr>
+          <a:lstStyle/>
+          <a:p>
+            <a:pPr marL="0" indent="0" algn="ctr">
+              <a:buNone/>
+            </a:pPr>
+            <a:r>
+              <a:rPr lang="en-US" sz="2500" dirty="0" err="1">
+                <a:hlinkClick r:id="rId2"/>
+              </a:rPr>
+              <a:t>Componen</a:t>
+            </a:r>
+            <a:r>
+              <a:rPr lang="ro-RO" sz="2500" dirty="0">
+                <a:hlinkClick r:id="rId2"/>
+              </a:rPr>
+              <a:t>ța costurilor companiei </a:t>
+            </a:r>
+            <a:r>
+              <a:rPr lang="en-US" sz="2500" dirty="0">
+                <a:hlinkClick r:id="rId2"/>
+              </a:rPr>
+              <a:t>G</a:t>
+            </a:r>
+            <a:r>
+              <a:rPr lang="ro-RO" sz="2500" dirty="0" err="1">
+                <a:hlinkClick r:id="rId2"/>
+              </a:rPr>
+              <a:t>oogle</a:t>
+            </a:r>
+            <a:r>
+              <a:rPr lang="en-US" sz="2500" dirty="0">
+                <a:hlinkClick r:id="rId2"/>
+              </a:rPr>
+              <a:t> </a:t>
+            </a:r>
+            <a:r>
+              <a:rPr lang="en-US" sz="2500" dirty="0" err="1"/>
+              <a:t>pentru</a:t>
+            </a:r>
+            <a:r>
+              <a:rPr lang="en-US" sz="2500" dirty="0"/>
+              <a:t> </a:t>
+            </a:r>
+            <a:r>
+              <a:rPr lang="en-US" sz="2500" dirty="0" err="1"/>
+              <a:t>anul</a:t>
+            </a:r>
+            <a:r>
+              <a:rPr lang="en-US" sz="2500" dirty="0"/>
+              <a:t> 2020</a:t>
+            </a:r>
+            <a:r>
+              <a:rPr lang="ro-RO" sz="2500" dirty="0"/>
+              <a:t>.</a:t>
+            </a:r>
+            <a:r>
+              <a:rPr lang="en-US" sz="2500" dirty="0"/>
+              <a:t> ( </a:t>
+            </a:r>
+            <a:r>
+              <a:rPr lang="en-US" sz="2500" dirty="0" err="1"/>
+              <a:t>milioane</a:t>
+            </a:r>
+            <a:r>
+              <a:rPr lang="en-US" sz="2500" dirty="0"/>
+              <a:t> USD )</a:t>
+            </a:r>
+            <a:endParaRPr lang="ro-RO" sz="2500" dirty="0"/>
+          </a:p>
+        </p:txBody>
+      </p:sp>
+      <p:pic>
+        <p:nvPicPr>
+          <p:cNvPr id="1034" name="Picture 10" descr="Google Icons – Free Vector Download, PNG, SVG, GIF">
+            <a:extLst>
+              <a:ext uri="{FF2B5EF4-FFF2-40B4-BE49-F238E27FC236}">
+                <a16:creationId xmlns:a16="http://schemas.microsoft.com/office/drawing/2014/main" id="{A5FD8672-7AA8-4476-9995-0D61030A417A}"/>
+              </a:ext>
+            </a:extLst>
+          </p:cNvPr>
+          <p:cNvPicPr>
+            <a:picLocks noChangeAspect="1" noChangeArrowheads="1"/>
+          </p:cNvPicPr>
+          <p:nvPr/>
+        </p:nvPicPr>
+        <p:blipFill>
+          <a:blip r:embed="rId3">
+            <a:extLst>
+              <a:ext uri="{28A0092B-C50C-407E-A947-70E740481C1C}">
+                <a14:useLocalDpi xmlns:a14="http://schemas.microsoft.com/office/drawing/2010/main" val="0"/>
+              </a:ext>
+            </a:extLst>
+          </a:blip>
+          <a:srcRect/>
+          <a:stretch>
+            <a:fillRect/>
+          </a:stretch>
+        </p:blipFill>
+        <p:spPr bwMode="auto">
+          <a:xfrm>
+            <a:off x="2231136" y="606552"/>
+            <a:ext cx="1905000" cy="1905000"/>
+          </a:xfrm>
+          <a:prstGeom prst="rect">
+            <a:avLst/>
+          </a:prstGeom>
+          <a:noFill/>
+          <a:extLst>
+            <a:ext uri="{909E8E84-426E-40DD-AFC4-6F175D3DCCD1}">
+              <a14:hiddenFill xmlns:a14="http://schemas.microsoft.com/office/drawing/2010/main">
+                <a:solidFill>
+                  <a:srgbClr val="FFFFFF"/>
+                </a:solidFill>
+              </a14:hiddenFill>
+            </a:ext>
+          </a:extLst>
+        </p:spPr>
+      </p:pic>
+      <p:pic>
+        <p:nvPicPr>
+          <p:cNvPr id="11" name="Picture 10">
+            <a:extLst>
+              <a:ext uri="{FF2B5EF4-FFF2-40B4-BE49-F238E27FC236}">
+                <a16:creationId xmlns:a16="http://schemas.microsoft.com/office/drawing/2014/main" id="{D50CFF19-28A2-41D2-B670-8CBEB0022620}"/>
+              </a:ext>
+            </a:extLst>
+          </p:cNvPr>
+          <p:cNvPicPr>
+            <a:picLocks noChangeAspect="1"/>
+          </p:cNvPicPr>
+          <p:nvPr/>
+        </p:nvPicPr>
+        <p:blipFill>
+          <a:blip r:embed="rId4"/>
+          <a:stretch>
+            <a:fillRect/>
+          </a:stretch>
+        </p:blipFill>
+        <p:spPr>
+          <a:xfrm>
+            <a:off x="765716" y="5210541"/>
+            <a:ext cx="4696207" cy="1323477"/>
+          </a:xfrm>
+          <a:prstGeom prst="rect">
+            <a:avLst/>
+          </a:prstGeom>
+        </p:spPr>
+      </p:pic>
+      <p:pic>
+        <p:nvPicPr>
+          <p:cNvPr id="13" name="Picture 12">
+            <a:extLst>
+              <a:ext uri="{FF2B5EF4-FFF2-40B4-BE49-F238E27FC236}">
+                <a16:creationId xmlns:a16="http://schemas.microsoft.com/office/drawing/2014/main" id="{81381902-2FA2-43A6-887F-205EF4F4A019}"/>
+              </a:ext>
+            </a:extLst>
+          </p:cNvPr>
+          <p:cNvPicPr>
+            <a:picLocks noChangeAspect="1"/>
+          </p:cNvPicPr>
+          <p:nvPr/>
+        </p:nvPicPr>
+        <p:blipFill>
+          <a:blip r:embed="rId5"/>
+          <a:stretch>
+            <a:fillRect/>
+          </a:stretch>
+        </p:blipFill>
+        <p:spPr>
+          <a:xfrm>
+            <a:off x="6386284" y="3812843"/>
+            <a:ext cx="4691699" cy="823105"/>
+          </a:xfrm>
+          <a:prstGeom prst="rect">
+            <a:avLst/>
+          </a:prstGeom>
+        </p:spPr>
+      </p:pic>
+      <p:pic>
+        <p:nvPicPr>
+          <p:cNvPr id="15" name="Picture 14">
+            <a:extLst>
+              <a:ext uri="{FF2B5EF4-FFF2-40B4-BE49-F238E27FC236}">
+                <a16:creationId xmlns:a16="http://schemas.microsoft.com/office/drawing/2014/main" id="{013408F8-16CA-4268-B2FE-1E4663BE794A}"/>
+              </a:ext>
+            </a:extLst>
+          </p:cNvPr>
+          <p:cNvPicPr>
+            <a:picLocks noChangeAspect="1"/>
+          </p:cNvPicPr>
+          <p:nvPr/>
+        </p:nvPicPr>
+        <p:blipFill>
+          <a:blip r:embed="rId6"/>
+          <a:stretch>
+            <a:fillRect/>
+          </a:stretch>
+        </p:blipFill>
+        <p:spPr>
+          <a:xfrm>
+            <a:off x="6386284" y="4818318"/>
+            <a:ext cx="4691699" cy="1715700"/>
+          </a:xfrm>
+          <a:prstGeom prst="rect">
+            <a:avLst/>
+          </a:prstGeom>
+        </p:spPr>
+      </p:pic>
+      <p:pic>
+        <p:nvPicPr>
+          <p:cNvPr id="27" name="Picture 26">
+            <a:extLst>
+              <a:ext uri="{FF2B5EF4-FFF2-40B4-BE49-F238E27FC236}">
+                <a16:creationId xmlns:a16="http://schemas.microsoft.com/office/drawing/2014/main" id="{F930330D-D5F5-4EFF-BBD7-2E04D2442DF0}"/>
+              </a:ext>
+            </a:extLst>
+          </p:cNvPr>
+          <p:cNvPicPr>
+            <a:picLocks noChangeAspect="1"/>
+          </p:cNvPicPr>
+          <p:nvPr/>
+        </p:nvPicPr>
+        <p:blipFill>
+          <a:blip r:embed="rId7"/>
+          <a:stretch>
+            <a:fillRect/>
+          </a:stretch>
+        </p:blipFill>
+        <p:spPr>
+          <a:xfrm>
+            <a:off x="765716" y="3812843"/>
+            <a:ext cx="4691700" cy="1249021"/>
+          </a:xfrm>
+          <a:prstGeom prst="rect">
+            <a:avLst/>
+          </a:prstGeom>
+        </p:spPr>
+      </p:pic>
+      <p:sp>
+        <p:nvSpPr>
+          <p:cNvPr id="30" name="TextBox 29">
+            <a:extLst>
+              <a:ext uri="{FF2B5EF4-FFF2-40B4-BE49-F238E27FC236}">
+                <a16:creationId xmlns:a16="http://schemas.microsoft.com/office/drawing/2014/main" id="{7EE4223F-D4DC-4B86-9D0F-D0B120712B70}"/>
+              </a:ext>
+            </a:extLst>
+          </p:cNvPr>
+          <p:cNvSpPr txBox="1"/>
+          <p:nvPr/>
+        </p:nvSpPr>
+        <p:spPr>
+          <a:xfrm>
+            <a:off x="765716" y="3335789"/>
+            <a:ext cx="4691700" cy="477054"/>
+          </a:xfrm>
+          <a:prstGeom prst="rect">
+            <a:avLst/>
+          </a:prstGeom>
+          <a:noFill/>
+        </p:spPr>
+        <p:txBody>
+          <a:bodyPr wrap="square">
+            <a:spAutoFit/>
+          </a:bodyPr>
+          <a:lstStyle/>
+          <a:p>
+            <a:r>
+              <a:rPr lang="en-US" sz="2500" dirty="0" err="1"/>
+              <a:t>Costul</a:t>
+            </a:r>
+            <a:r>
+              <a:rPr lang="en-US" sz="2500" dirty="0"/>
+              <a:t> fix </a:t>
+            </a:r>
+            <a:endParaRPr lang="ro-RO" sz="2500" dirty="0"/>
+          </a:p>
+        </p:txBody>
+      </p:sp>
+      <p:sp>
+        <p:nvSpPr>
+          <p:cNvPr id="32" name="TextBox 31">
+            <a:extLst>
+              <a:ext uri="{FF2B5EF4-FFF2-40B4-BE49-F238E27FC236}">
+                <a16:creationId xmlns:a16="http://schemas.microsoft.com/office/drawing/2014/main" id="{0A096284-4BDD-4594-9B81-552829B4EC34}"/>
+              </a:ext>
+            </a:extLst>
+          </p:cNvPr>
+          <p:cNvSpPr txBox="1"/>
+          <p:nvPr/>
+        </p:nvSpPr>
+        <p:spPr>
+          <a:xfrm>
+            <a:off x="6386284" y="3335789"/>
+            <a:ext cx="4691699" cy="477054"/>
+          </a:xfrm>
+          <a:prstGeom prst="rect">
+            <a:avLst/>
+          </a:prstGeom>
+          <a:noFill/>
+        </p:spPr>
+        <p:txBody>
+          <a:bodyPr wrap="square">
+            <a:spAutoFit/>
+          </a:bodyPr>
+          <a:lstStyle/>
+          <a:p>
+            <a:pPr algn="r"/>
+            <a:r>
+              <a:rPr lang="en-US" sz="2500" dirty="0" err="1"/>
+              <a:t>Costul</a:t>
+            </a:r>
+            <a:r>
+              <a:rPr lang="en-US" sz="2500" dirty="0"/>
+              <a:t> </a:t>
+            </a:r>
+            <a:r>
+              <a:rPr lang="en-US" sz="2500" dirty="0" err="1"/>
+              <a:t>variabil</a:t>
+            </a:r>
+            <a:r>
+              <a:rPr lang="en-US" sz="2500" dirty="0"/>
+              <a:t> </a:t>
+            </a:r>
+            <a:endParaRPr lang="ro-RO" sz="2500" dirty="0"/>
           </a:p>
         </p:txBody>
       </p:sp>
@@ -4308,6 +5494,217 @@
     <p:extLst>
       <p:ext uri="{BB962C8B-B14F-4D97-AF65-F5344CB8AC3E}">
         <p14:creationId xmlns:p14="http://schemas.microsoft.com/office/powerpoint/2010/main" val="1553853916"/>
+      </p:ext>
+    </p:extLst>
+  </p:cSld>
+  <p:clrMapOvr>
+    <a:masterClrMapping/>
+  </p:clrMapOvr>
+</p:sld>
+</file>
+
+<file path=ppt/slides/slide7.xml><?xml version="1.0" encoding="utf-8"?>
+<p:sld xmlns:a="http://schemas.openxmlformats.org/drawingml/2006/main" xmlns:r="http://schemas.openxmlformats.org/officeDocument/2006/relationships" xmlns:p="http://schemas.openxmlformats.org/presentationml/2006/main">
+  <p:cSld>
+    <p:spTree>
+      <p:nvGrpSpPr>
+        <p:cNvPr id="1" name=""/>
+        <p:cNvGrpSpPr/>
+        <p:nvPr/>
+      </p:nvGrpSpPr>
+      <p:grpSpPr>
+        <a:xfrm>
+          <a:off x="0" y="0"/>
+          <a:ext cx="0" cy="0"/>
+          <a:chOff x="0" y="0"/>
+          <a:chExt cx="0" cy="0"/>
+        </a:xfrm>
+      </p:grpSpPr>
+      <p:sp>
+        <p:nvSpPr>
+          <p:cNvPr id="2" name="Title 1">
+            <a:extLst>
+              <a:ext uri="{FF2B5EF4-FFF2-40B4-BE49-F238E27FC236}">
+                <a16:creationId xmlns:a16="http://schemas.microsoft.com/office/drawing/2014/main" id="{C03C2D3E-9BF6-4281-B609-ABE2CD9A3CBD}"/>
+              </a:ext>
+            </a:extLst>
+          </p:cNvPr>
+          <p:cNvSpPr>
+            <a:spLocks noGrp="1"/>
+          </p:cNvSpPr>
+          <p:nvPr>
+            <p:ph type="title"/>
+          </p:nvPr>
+        </p:nvSpPr>
+        <p:spPr/>
+        <p:txBody>
+          <a:bodyPr/>
+          <a:lstStyle/>
+          <a:p>
+            <a:r>
+              <a:rPr lang="ro-RO" dirty="0"/>
+              <a:t>Concluzii</a:t>
+            </a:r>
+          </a:p>
+        </p:txBody>
+      </p:sp>
+      <p:graphicFrame>
+        <p:nvGraphicFramePr>
+          <p:cNvPr id="6" name="Content Placeholder 5">
+            <a:extLst>
+              <a:ext uri="{FF2B5EF4-FFF2-40B4-BE49-F238E27FC236}">
+                <a16:creationId xmlns:a16="http://schemas.microsoft.com/office/drawing/2014/main" id="{4E6D7B5F-DF16-47E2-9B3B-48F9B403076C}"/>
+              </a:ext>
+            </a:extLst>
+          </p:cNvPr>
+          <p:cNvGraphicFramePr>
+            <a:graphicFrameLocks noGrp="1"/>
+          </p:cNvGraphicFramePr>
+          <p:nvPr>
+            <p:ph idx="1"/>
+            <p:extLst>
+              <p:ext uri="{D42A27DB-BD31-4B8C-83A1-F6EECF244321}">
+                <p14:modId xmlns:p14="http://schemas.microsoft.com/office/powerpoint/2010/main" val="3652658480"/>
+              </p:ext>
+            </p:extLst>
+          </p:nvPr>
+        </p:nvGraphicFramePr>
+        <p:xfrm>
+          <a:off x="425692" y="2153412"/>
+          <a:ext cx="5132388" cy="3957637"/>
+        </p:xfrm>
+        <a:graphic>
+          <a:graphicData uri="http://schemas.openxmlformats.org/drawingml/2006/chart">
+            <c:chart xmlns:c="http://schemas.openxmlformats.org/drawingml/2006/chart" xmlns:r="http://schemas.openxmlformats.org/officeDocument/2006/relationships" r:id="rId2"/>
+          </a:graphicData>
+        </a:graphic>
+      </p:graphicFrame>
+      <p:sp>
+        <p:nvSpPr>
+          <p:cNvPr id="11" name="TextBox 10">
+            <a:extLst>
+              <a:ext uri="{FF2B5EF4-FFF2-40B4-BE49-F238E27FC236}">
+                <a16:creationId xmlns:a16="http://schemas.microsoft.com/office/drawing/2014/main" id="{90364FFD-7EA0-416F-A5D9-B6271379ECA4}"/>
+              </a:ext>
+            </a:extLst>
+          </p:cNvPr>
+          <p:cNvSpPr txBox="1"/>
+          <p:nvPr/>
+        </p:nvSpPr>
+        <p:spPr>
+          <a:xfrm>
+            <a:off x="5558080" y="2659216"/>
+            <a:ext cx="6050151" cy="3554819"/>
+          </a:xfrm>
+          <a:prstGeom prst="rect">
+            <a:avLst/>
+          </a:prstGeom>
+          <a:noFill/>
+        </p:spPr>
+        <p:txBody>
+          <a:bodyPr wrap="square">
+            <a:spAutoFit/>
+          </a:bodyPr>
+          <a:lstStyle/>
+          <a:p>
+            <a:r>
+              <a:rPr lang="ro-RO" sz="2500" dirty="0"/>
+              <a:t>Pentru a funcționa orice companie are nevoie sa </a:t>
+            </a:r>
+            <a:r>
+              <a:rPr lang="ro-RO" sz="2500" dirty="0" err="1"/>
+              <a:t>faca</a:t>
+            </a:r>
+            <a:r>
+              <a:rPr lang="ro-RO" sz="2500" dirty="0"/>
+              <a:t> unele cheltuieli. Cu, cât compania este mai mare cu atât </a:t>
+            </a:r>
+            <a:r>
+              <a:rPr lang="ro-RO" sz="2500" dirty="0" err="1"/>
+              <a:t>cheltuieile</a:t>
+            </a:r>
+            <a:r>
+              <a:rPr lang="ro-RO" sz="2500" dirty="0"/>
+              <a:t> ei sunt mai mari. În diagrama alăturată este arătat acest lucru: din venitul de </a:t>
+            </a:r>
+            <a:r>
+              <a:rPr lang="en-US" sz="2500" dirty="0"/>
+              <a:t>182,350</a:t>
+            </a:r>
+            <a:r>
+              <a:rPr lang="ro-RO" sz="2500" dirty="0"/>
+              <a:t> milioane USD în jur de 45% au fost cheltuiți pentru ca compania să poată activa. O altă concluzie este că principala cheltuială a companiilor IT este remunerarea angajaților.</a:t>
+            </a:r>
+          </a:p>
+        </p:txBody>
+      </p:sp>
+    </p:spTree>
+    <p:extLst>
+      <p:ext uri="{BB962C8B-B14F-4D97-AF65-F5344CB8AC3E}">
+        <p14:creationId xmlns:p14="http://schemas.microsoft.com/office/powerpoint/2010/main" val="3262730575"/>
+      </p:ext>
+    </p:extLst>
+  </p:cSld>
+  <p:clrMapOvr>
+    <a:masterClrMapping/>
+  </p:clrMapOvr>
+</p:sld>
+</file>
+
+<file path=ppt/slides/slide8.xml><?xml version="1.0" encoding="utf-8"?>
+<p:sld xmlns:a="http://schemas.openxmlformats.org/drawingml/2006/main" xmlns:r="http://schemas.openxmlformats.org/officeDocument/2006/relationships" xmlns:p="http://schemas.openxmlformats.org/presentationml/2006/main">
+  <p:cSld>
+    <p:spTree>
+      <p:nvGrpSpPr>
+        <p:cNvPr id="1" name=""/>
+        <p:cNvGrpSpPr/>
+        <p:nvPr/>
+      </p:nvGrpSpPr>
+      <p:grpSpPr>
+        <a:xfrm>
+          <a:off x="0" y="0"/>
+          <a:ext cx="0" cy="0"/>
+          <a:chOff x="0" y="0"/>
+          <a:chExt cx="0" cy="0"/>
+        </a:xfrm>
+      </p:grpSpPr>
+      <p:sp>
+        <p:nvSpPr>
+          <p:cNvPr id="2" name="Title 1">
+            <a:extLst>
+              <a:ext uri="{FF2B5EF4-FFF2-40B4-BE49-F238E27FC236}">
+                <a16:creationId xmlns:a16="http://schemas.microsoft.com/office/drawing/2014/main" id="{D34CC2AF-C2E4-464E-BEA8-0DD12277A949}"/>
+              </a:ext>
+            </a:extLst>
+          </p:cNvPr>
+          <p:cNvSpPr>
+            <a:spLocks noGrp="1"/>
+          </p:cNvSpPr>
+          <p:nvPr>
+            <p:ph type="title"/>
+          </p:nvPr>
+        </p:nvSpPr>
+        <p:spPr>
+          <a:xfrm>
+            <a:off x="2231136" y="2834640"/>
+            <a:ext cx="7729728" cy="1188720"/>
+          </a:xfrm>
+        </p:spPr>
+        <p:txBody>
+          <a:bodyPr/>
+          <a:lstStyle/>
+          <a:p>
+            <a:r>
+              <a:rPr lang="ro-RO" dirty="0"/>
+              <a:t>Mulțumesc pentru atenție</a:t>
+            </a:r>
+          </a:p>
+        </p:txBody>
+      </p:sp>
+    </p:spTree>
+    <p:extLst>
+      <p:ext uri="{BB962C8B-B14F-4D97-AF65-F5344CB8AC3E}">
+        <p14:creationId xmlns:p14="http://schemas.microsoft.com/office/powerpoint/2010/main" val="1034502763"/>
       </p:ext>
     </p:extLst>
   </p:cSld>

</xml_diff>